<commit_message>
Update presentation & script
</commit_message>
<xml_diff>
--- a/Team Rubicon.pptx
+++ b/Team Rubicon.pptx
@@ -268,7 +268,7 @@
           <a:bodyPr lIns="0" rIns="0" tIns="0" bIns="0" anchor="b"/>
           <a:p>
             <a:pPr algn="r"/>
-            <a:fld id="{DFCF8543-A286-4CC4-B9E0-95241488AB64}" type="slidenum">
+            <a:fld id="{512D0465-5AC3-4E6F-9BB4-E1F41C1A1E68}" type="slidenum">
               <a:rPr b="0" lang="en-GB" sz="1400" spc="-1" strike="noStrike">
                 <a:solidFill>
                   <a:srgbClr val="000000"/>
@@ -531,7 +531,7 @@
                 <a:spcPct val="100000"/>
               </a:lnSpc>
             </a:pPr>
-            <a:fld id="{864B206E-C7DE-4BD0-8A58-C162750EB4DE}" type="slidenum">
+            <a:fld id="{54B47F21-ED1E-4258-8F7E-04027F791EF0}" type="slidenum">
               <a:rPr b="0" lang="en-GB" sz="1200" spc="-1" strike="noStrike">
                 <a:solidFill>
                   <a:srgbClr val="000000"/>
@@ -659,7 +659,7 @@
                 <a:spcPct val="100000"/>
               </a:lnSpc>
             </a:pPr>
-            <a:fld id="{0B889607-B870-4F68-8F6D-CB3A89A64828}" type="slidenum">
+            <a:fld id="{95345089-5D20-4377-9062-4289495B759E}" type="slidenum">
               <a:rPr b="0" lang="en-GB" sz="1200" spc="-1" strike="noStrike">
                 <a:solidFill>
                   <a:srgbClr val="000000"/>
@@ -787,7 +787,7 @@
                 <a:spcPct val="100000"/>
               </a:lnSpc>
             </a:pPr>
-            <a:fld id="{46E4057F-9345-439D-B699-16B78074DFE4}" type="slidenum">
+            <a:fld id="{90D6D0FA-98CD-4740-A6E5-8FF80A869EFB}" type="slidenum">
               <a:rPr b="0" lang="en-GB" sz="1200" spc="-1" strike="noStrike">
                 <a:solidFill>
                   <a:srgbClr val="000000"/>
@@ -8247,7 +8247,7 @@
                 <a:spcPct val="100000"/>
               </a:lnSpc>
             </a:pPr>
-            <a:fld id="{B1DDE3CA-6AC1-47E9-A7CD-0E1CD162217D}" type="datetime">
+            <a:fld id="{C009AFD9-0046-412D-90C1-C816F70AFF93}" type="datetime">
               <a:rPr b="0" lang="en-GB" sz="1200" spc="-1" strike="noStrike">
                 <a:solidFill>
                   <a:srgbClr val="8b8b8b"/>
@@ -8338,7 +8338,7 @@
                 <a:spcPct val="100000"/>
               </a:lnSpc>
             </a:pPr>
-            <a:fld id="{A0264978-8582-4415-9333-4F7FCD104132}" type="slidenum">
+            <a:fld id="{546A709A-B571-48C4-AD18-954A059E797F}" type="slidenum">
               <a:rPr b="0" lang="en-GB" sz="1200" spc="-1" strike="noStrike">
                 <a:solidFill>
                   <a:srgbClr val="8b8b8b"/>
@@ -8968,7 +8968,7 @@
                 <a:spcPct val="100000"/>
               </a:lnSpc>
             </a:pPr>
-            <a:fld id="{6B5AC86C-75AD-4BBD-9634-229EFCDE035C}" type="datetime">
+            <a:fld id="{7275AACA-99E4-45B3-8CE9-706D749B33C1}" type="datetime">
               <a:rPr b="0" lang="en-GB" sz="1050" spc="-1" strike="noStrike">
                 <a:solidFill>
                   <a:srgbClr val="000000"/>
@@ -9059,7 +9059,7 @@
                 <a:spcPct val="100000"/>
               </a:lnSpc>
             </a:pPr>
-            <a:fld id="{53732C46-4896-4BE2-915F-0B35AF1F8C6B}" type="slidenum">
+            <a:fld id="{3283FAAA-9F82-4F93-9A45-C4C6D52A3711}" type="slidenum">
               <a:rPr b="0" lang="en-GB" sz="1100" spc="-1" strike="noStrike">
                 <a:solidFill>
                   <a:srgbClr val="ffffff"/>
@@ -9421,7 +9421,7 @@
                 <a:spcPct val="100000"/>
               </a:lnSpc>
             </a:pPr>
-            <a:fld id="{E3AB5793-0D68-464B-945E-6F84232C9ABF}" type="datetime">
+            <a:fld id="{CA345C81-2E78-410A-8954-AF3752D991D8}" type="datetime">
               <a:rPr b="0" lang="en-GB" sz="1050" spc="-1" strike="noStrike">
                 <a:solidFill>
                   <a:srgbClr val="000000"/>
@@ -9512,7 +9512,7 @@
                 <a:spcPct val="100000"/>
               </a:lnSpc>
             </a:pPr>
-            <a:fld id="{CCD18977-BD26-419A-811A-6AADF9A4194A}" type="slidenum">
+            <a:fld id="{F6C7B54F-4C1C-42B7-8813-0C111468D60C}" type="slidenum">
               <a:rPr b="0" lang="en-GB" sz="1100" spc="-1" strike="noStrike">
                 <a:solidFill>
                   <a:srgbClr val="ffffff"/>
@@ -9874,7 +9874,7 @@
                 <a:spcPct val="100000"/>
               </a:lnSpc>
             </a:pPr>
-            <a:fld id="{3A50EEE4-359F-4788-AE83-9CAA7A5D8897}" type="datetime">
+            <a:fld id="{EF4282CE-9473-404A-8185-BAAC9442A298}" type="datetime">
               <a:rPr b="0" lang="en-GB" sz="1200" spc="-1" strike="noStrike">
                 <a:solidFill>
                   <a:srgbClr val="8b8b8b"/>
@@ -9965,7 +9965,7 @@
                 <a:spcPct val="100000"/>
               </a:lnSpc>
             </a:pPr>
-            <a:fld id="{905A228F-EA0C-443C-BDFF-D479AF168CC4}" type="slidenum">
+            <a:fld id="{B7A78970-B16D-4C6C-910D-E873F6D7608F}" type="slidenum">
               <a:rPr b="0" lang="en-GB" sz="1200" spc="-1" strike="noStrike">
                 <a:solidFill>
                   <a:srgbClr val="8b8b8b"/>
@@ -10327,7 +10327,7 @@
                 <a:spcPct val="100000"/>
               </a:lnSpc>
             </a:pPr>
-            <a:fld id="{1160EC7A-AE8B-4F43-8261-9433D7630FDE}" type="datetime">
+            <a:fld id="{EEA36F68-8BF6-46E4-99EC-1937FC3FACFE}" type="datetime">
               <a:rPr b="0" lang="en-GB" sz="1050" spc="-1" strike="noStrike">
                 <a:solidFill>
                   <a:srgbClr val="000000"/>
@@ -10418,7 +10418,7 @@
                 <a:spcPct val="100000"/>
               </a:lnSpc>
             </a:pPr>
-            <a:fld id="{E01B92BE-0C34-47FC-9CBA-5732385EDD63}" type="slidenum">
+            <a:fld id="{D9AF98E1-A856-4D6B-862F-45362AA588D9}" type="slidenum">
               <a:rPr b="0" lang="en-GB" sz="1100" spc="-1" strike="noStrike">
                 <a:solidFill>
                   <a:srgbClr val="ffffff"/>
@@ -15871,7 +15871,7 @@
                 </a:uFill>
                 <a:latin typeface="Gill Sans MT"/>
               </a:rPr>
-              <a:t>QR Code</a:t>
+              <a:t>QR Code APP</a:t>
             </a:r>
             <a:endParaRPr b="0" lang="en-US" sz="1800" spc="-1" strike="noStrike">
               <a:solidFill>
@@ -15896,7 +15896,7 @@
         <p:spPr>
           <a:xfrm>
             <a:off x="792000" y="1985040"/>
-            <a:ext cx="7344000" cy="4494960"/>
+            <a:ext cx="7776000" cy="4494960"/>
           </a:xfrm>
           <a:prstGeom prst="rect">
             <a:avLst/>
@@ -15988,26 +15988,8 @@
                 </a:uFill>
                 <a:latin typeface="Gill Sans MT"/>
               </a:rPr>
-              <a:t> </a:t>
+              <a:t>Quickly assign roles to staff and keep track of spolunteer movement</a:t>
             </a:r>
-            <a:endParaRPr b="0" lang="en-US" sz="1800" spc="-1" strike="noStrike">
-              <a:solidFill>
-                <a:srgbClr val="262626"/>
-              </a:solidFill>
-              <a:uFill>
-                <a:solidFill>
-                  <a:srgbClr val="ffffff"/>
-                </a:solidFill>
-              </a:uFill>
-              <a:latin typeface="Gill Sans MT"/>
-            </a:endParaRPr>
-          </a:p>
-          <a:p>
-            <a:pPr>
-              <a:lnSpc>
-                <a:spcPct val="100000"/>
-              </a:lnSpc>
-            </a:pPr>
             <a:endParaRPr b="0" lang="en-US" sz="1800" spc="-1" strike="noStrike">
               <a:solidFill>
                 <a:srgbClr val="262626"/>
@@ -16043,7 +16025,62 @@
                 </a:uFill>
                 <a:latin typeface="Gill Sans MT"/>
               </a:rPr>
-              <a:t>Addresses requirements </a:t>
+              <a:t>Only relevant information visible to staff</a:t>
+            </a:r>
+            <a:endParaRPr b="0" lang="en-US" sz="1800" spc="-1" strike="noStrike">
+              <a:solidFill>
+                <a:srgbClr val="262626"/>
+              </a:solidFill>
+              <a:uFill>
+                <a:solidFill>
+                  <a:srgbClr val="ffffff"/>
+                </a:solidFill>
+              </a:uFill>
+              <a:latin typeface="Gill Sans MT"/>
+            </a:endParaRPr>
+          </a:p>
+          <a:p>
+            <a:pPr>
+              <a:lnSpc>
+                <a:spcPct val="100000"/>
+              </a:lnSpc>
+            </a:pPr>
+            <a:endParaRPr b="0" lang="en-US" sz="1800" spc="-1" strike="noStrike">
+              <a:solidFill>
+                <a:srgbClr val="262626"/>
+              </a:solidFill>
+              <a:uFill>
+                <a:solidFill>
+                  <a:srgbClr val="ffffff"/>
+                </a:solidFill>
+              </a:uFill>
+              <a:latin typeface="Gill Sans MT"/>
+            </a:endParaRPr>
+          </a:p>
+          <a:p>
+            <a:pPr marL="228600" indent="-228240">
+              <a:lnSpc>
+                <a:spcPct val="100000"/>
+              </a:lnSpc>
+              <a:buClr>
+                <a:srgbClr val="9bafb5"/>
+              </a:buClr>
+              <a:buFont typeface="Arial"/>
+              <a:buChar char="•"/>
+            </a:pPr>
+            <a:r>
+              <a:rPr b="0" lang="en-US" sz="2000" spc="-1" strike="noStrike">
+                <a:solidFill>
+                  <a:srgbClr val="262626"/>
+                </a:solidFill>
+                <a:uFill>
+                  <a:solidFill>
+                    <a:srgbClr val="ffffff"/>
+                  </a:solidFill>
+                </a:uFill>
+                <a:latin typeface="Gill Sans MT"/>
+              </a:rPr>
+              <a:t>Addresses requirements: </a:t>
             </a:r>
             <a:endParaRPr b="0" lang="en-US" sz="1800" spc="-1" strike="noStrike">
               <a:solidFill>
@@ -16080,7 +16117,7 @@
                 </a:uFill>
                 <a:latin typeface="Gill Sans MT"/>
               </a:rPr>
-              <a:t>Scalability</a:t>
+              <a:t>Speed</a:t>
             </a:r>
             <a:endParaRPr b="0" lang="en-US" sz="1600" spc="-1" strike="noStrike">
               <a:solidFill>
@@ -16117,44 +16154,7 @@
                 </a:uFill>
                 <a:latin typeface="Gill Sans MT"/>
               </a:rPr>
-              <a:t>Security</a:t>
-            </a:r>
-            <a:endParaRPr b="0" lang="en-US" sz="1600" spc="-1" strike="noStrike">
-              <a:solidFill>
-                <a:srgbClr val="262626"/>
-              </a:solidFill>
-              <a:uFill>
-                <a:solidFill>
-                  <a:srgbClr val="ffffff"/>
-                </a:solidFill>
-              </a:uFill>
-              <a:latin typeface="Gill Sans MT"/>
-            </a:endParaRPr>
-          </a:p>
-          <a:p>
-            <a:pPr lvl="1" marL="457200" indent="-228240">
-              <a:lnSpc>
-                <a:spcPct val="100000"/>
-              </a:lnSpc>
-              <a:buClr>
-                <a:srgbClr val="9bafb5"/>
-              </a:buClr>
-              <a:buFont typeface="Wingdings" charset="2"/>
-              <a:buChar char=""/>
-            </a:pPr>
-            <a:r>
-              <a:rPr b="0" lang="en-US" sz="1600" spc="-1" strike="noStrike">
-                <a:solidFill>
-                  <a:srgbClr val="262626"/>
-                </a:solidFill>
-                <a:uFill>
-                  <a:solidFill>
-                    <a:srgbClr val="ffffff"/>
-                  </a:solidFill>
-                </a:uFill>
-                <a:latin typeface="Gill Sans MT"/>
-              </a:rPr>
-              <a:t>Location track</a:t>
+              <a:t>Simplicity</a:t>
             </a:r>
             <a:endParaRPr b="0" lang="en-US" sz="1600" spc="-1" strike="noStrike">
               <a:solidFill>

</xml_diff>